<commit_message>
Fixed a bug in GOxCell type code, added summary output Updated powerpoint slides
</commit_message>
<xml_diff>
--- a/docs/CellTypes.pptx
+++ b/docs/CellTypes.pptx
@@ -24,6 +24,24 @@
     <p:sldId id="269" r:id="rId18"/>
     <p:sldId id="274" r:id="rId19"/>
     <p:sldId id="275" r:id="rId20"/>
+    <p:sldId id="276" r:id="rId21"/>
+    <p:sldId id="277" r:id="rId22"/>
+    <p:sldId id="280" r:id="rId23"/>
+    <p:sldId id="281" r:id="rId24"/>
+    <p:sldId id="282" r:id="rId25"/>
+    <p:sldId id="283" r:id="rId26"/>
+    <p:sldId id="287" r:id="rId27"/>
+    <p:sldId id="285" r:id="rId28"/>
+    <p:sldId id="291" r:id="rId29"/>
+    <p:sldId id="292" r:id="rId30"/>
+    <p:sldId id="293" r:id="rId31"/>
+    <p:sldId id="294" r:id="rId32"/>
+    <p:sldId id="278" r:id="rId33"/>
+    <p:sldId id="288" r:id="rId34"/>
+    <p:sldId id="286" r:id="rId35"/>
+    <p:sldId id="279" r:id="rId36"/>
+    <p:sldId id="290" r:id="rId37"/>
+    <p:sldId id="289" r:id="rId38"/>
   </p:sldIdLst>
   <p:sldSz cx="9144000" cy="6858000" type="screen4x3"/>
   <p:notesSz cx="6858000" cy="9144000"/>
@@ -306,7 +324,7 @@
           <a:p>
             <a:fld id="{5D76215D-E2B2-B842-9318-5ACD6F42FB2F}" type="datetimeFigureOut">
               <a:rPr lang="en-US" smtClean="0"/>
-              <a:t>16-07-21</a:t>
+              <a:t>16-08-04</a:t>
             </a:fld>
             <a:endParaRPr lang="en-US"/>
           </a:p>
@@ -476,7 +494,7 @@
           <a:p>
             <a:fld id="{5D76215D-E2B2-B842-9318-5ACD6F42FB2F}" type="datetimeFigureOut">
               <a:rPr lang="en-US" smtClean="0"/>
-              <a:t>16-07-21</a:t>
+              <a:t>16-08-04</a:t>
             </a:fld>
             <a:endParaRPr lang="en-US"/>
           </a:p>
@@ -656,7 +674,7 @@
           <a:p>
             <a:fld id="{5D76215D-E2B2-B842-9318-5ACD6F42FB2F}" type="datetimeFigureOut">
               <a:rPr lang="en-US" smtClean="0"/>
-              <a:t>16-07-21</a:t>
+              <a:t>16-08-04</a:t>
             </a:fld>
             <a:endParaRPr lang="en-US"/>
           </a:p>
@@ -826,7 +844,7 @@
           <a:p>
             <a:fld id="{5D76215D-E2B2-B842-9318-5ACD6F42FB2F}" type="datetimeFigureOut">
               <a:rPr lang="en-US" smtClean="0"/>
-              <a:t>16-07-21</a:t>
+              <a:t>16-08-04</a:t>
             </a:fld>
             <a:endParaRPr lang="en-US"/>
           </a:p>
@@ -1072,7 +1090,7 @@
           <a:p>
             <a:fld id="{5D76215D-E2B2-B842-9318-5ACD6F42FB2F}" type="datetimeFigureOut">
               <a:rPr lang="en-US" smtClean="0"/>
-              <a:t>16-07-21</a:t>
+              <a:t>16-08-04</a:t>
             </a:fld>
             <a:endParaRPr lang="en-US"/>
           </a:p>
@@ -1360,7 +1378,7 @@
           <a:p>
             <a:fld id="{5D76215D-E2B2-B842-9318-5ACD6F42FB2F}" type="datetimeFigureOut">
               <a:rPr lang="en-US" smtClean="0"/>
-              <a:t>16-07-21</a:t>
+              <a:t>16-08-04</a:t>
             </a:fld>
             <a:endParaRPr lang="en-US"/>
           </a:p>
@@ -1782,7 +1800,7 @@
           <a:p>
             <a:fld id="{5D76215D-E2B2-B842-9318-5ACD6F42FB2F}" type="datetimeFigureOut">
               <a:rPr lang="en-US" smtClean="0"/>
-              <a:t>16-07-21</a:t>
+              <a:t>16-08-04</a:t>
             </a:fld>
             <a:endParaRPr lang="en-US"/>
           </a:p>
@@ -1900,7 +1918,7 @@
           <a:p>
             <a:fld id="{5D76215D-E2B2-B842-9318-5ACD6F42FB2F}" type="datetimeFigureOut">
               <a:rPr lang="en-US" smtClean="0"/>
-              <a:t>16-07-21</a:t>
+              <a:t>16-08-04</a:t>
             </a:fld>
             <a:endParaRPr lang="en-US"/>
           </a:p>
@@ -1995,7 +2013,7 @@
           <a:p>
             <a:fld id="{5D76215D-E2B2-B842-9318-5ACD6F42FB2F}" type="datetimeFigureOut">
               <a:rPr lang="en-US" smtClean="0"/>
-              <a:t>16-07-21</a:t>
+              <a:t>16-08-04</a:t>
             </a:fld>
             <a:endParaRPr lang="en-US"/>
           </a:p>
@@ -2272,7 +2290,7 @@
           <a:p>
             <a:fld id="{5D76215D-E2B2-B842-9318-5ACD6F42FB2F}" type="datetimeFigureOut">
               <a:rPr lang="en-US" smtClean="0"/>
-              <a:t>16-07-21</a:t>
+              <a:t>16-08-04</a:t>
             </a:fld>
             <a:endParaRPr lang="en-US"/>
           </a:p>
@@ -2525,7 +2543,7 @@
           <a:p>
             <a:fld id="{5D76215D-E2B2-B842-9318-5ACD6F42FB2F}" type="datetimeFigureOut">
               <a:rPr lang="en-US" smtClean="0"/>
-              <a:t>16-07-21</a:t>
+              <a:t>16-08-04</a:t>
             </a:fld>
             <a:endParaRPr lang="en-US"/>
           </a:p>
@@ -2738,7 +2756,7 @@
           <a:p>
             <a:fld id="{5D76215D-E2B2-B842-9318-5ACD6F42FB2F}" type="datetimeFigureOut">
               <a:rPr lang="en-US" smtClean="0"/>
-              <a:t>16-07-21</a:t>
+              <a:t>16-08-04</a:t>
             </a:fld>
             <a:endParaRPr lang="en-US"/>
           </a:p>
@@ -4393,6 +4411,936 @@
 </p:sld>
 </file>
 
+<file path=ppt/slides/slide20.xml><?xml version="1.0" encoding="utf-8"?>
+<p:sld xmlns:a="http://schemas.openxmlformats.org/drawingml/2006/main" xmlns:r="http://schemas.openxmlformats.org/officeDocument/2006/relationships" xmlns:p="http://schemas.openxmlformats.org/presentationml/2006/main">
+  <p:cSld>
+    <p:spTree>
+      <p:nvGrpSpPr>
+        <p:cNvPr id="1" name=""/>
+        <p:cNvGrpSpPr/>
+        <p:nvPr/>
+      </p:nvGrpSpPr>
+      <p:grpSpPr>
+        <a:xfrm>
+          <a:off x="0" y="0"/>
+          <a:ext cx="0" cy="0"/>
+          <a:chOff x="0" y="0"/>
+          <a:chExt cx="0" cy="0"/>
+        </a:xfrm>
+      </p:grpSpPr>
+      <p:sp>
+        <p:nvSpPr>
+          <p:cNvPr id="2" name="Title 1"/>
+          <p:cNvSpPr>
+            <a:spLocks noGrp="1"/>
+          </p:cNvSpPr>
+          <p:nvPr>
+            <p:ph type="title"/>
+          </p:nvPr>
+        </p:nvSpPr>
+        <p:spPr/>
+        <p:txBody>
+          <a:bodyPr/>
+          <a:lstStyle/>
+          <a:p>
+            <a:r>
+              <a:rPr lang="en-US" dirty="0" smtClean="0"/>
+              <a:t>Updates Aug 1, 2016</a:t>
+            </a:r>
+            <a:endParaRPr lang="en-US" dirty="0"/>
+          </a:p>
+        </p:txBody>
+      </p:sp>
+      <p:pic>
+        <p:nvPicPr>
+          <p:cNvPr id="4" name="Picture 3"/>
+          <p:cNvPicPr>
+            <a:picLocks noChangeAspect="1"/>
+          </p:cNvPicPr>
+          <p:nvPr/>
+        </p:nvPicPr>
+        <p:blipFill>
+          <a:blip r:embed="rId2"/>
+          <a:stretch>
+            <a:fillRect/>
+          </a:stretch>
+        </p:blipFill>
+        <p:spPr>
+          <a:xfrm>
+            <a:off x="0" y="2184400"/>
+            <a:ext cx="9144000" cy="2476340"/>
+          </a:xfrm>
+          <a:prstGeom prst="rect">
+            <a:avLst/>
+          </a:prstGeom>
+        </p:spPr>
+      </p:pic>
+      <p:sp>
+        <p:nvSpPr>
+          <p:cNvPr id="5" name="TextBox 4"/>
+          <p:cNvSpPr txBox="1"/>
+          <p:nvPr/>
+        </p:nvSpPr>
+        <p:spPr>
+          <a:xfrm>
+            <a:off x="1352176" y="1658471"/>
+            <a:ext cx="3534441" cy="369332"/>
+          </a:xfrm>
+          <a:prstGeom prst="rect">
+            <a:avLst/>
+          </a:prstGeom>
+          <a:noFill/>
+        </p:spPr>
+        <p:txBody>
+          <a:bodyPr wrap="none" rtlCol="0">
+            <a:spAutoFit/>
+          </a:bodyPr>
+          <a:lstStyle/>
+          <a:p>
+            <a:r>
+              <a:rPr lang="en-US" dirty="0" err="1" smtClean="0"/>
+              <a:t>Mistry</a:t>
+            </a:r>
+            <a:r>
+              <a:rPr lang="en-US" dirty="0" smtClean="0"/>
+              <a:t> and </a:t>
+            </a:r>
+            <a:r>
+              <a:rPr lang="en-US" dirty="0" err="1" smtClean="0"/>
+              <a:t>Pavlidis</a:t>
+            </a:r>
+            <a:r>
+              <a:rPr lang="en-US" dirty="0" smtClean="0"/>
+              <a:t> dataset sources:</a:t>
+            </a:r>
+            <a:endParaRPr lang="en-US" dirty="0"/>
+          </a:p>
+        </p:txBody>
+      </p:sp>
+    </p:spTree>
+    <p:extLst>
+      <p:ext uri="{BB962C8B-B14F-4D97-AF65-F5344CB8AC3E}">
+        <p14:creationId xmlns:p14="http://schemas.microsoft.com/office/powerpoint/2010/main" val="2838374703"/>
+      </p:ext>
+    </p:extLst>
+  </p:cSld>
+  <p:clrMapOvr>
+    <a:masterClrMapping/>
+  </p:clrMapOvr>
+</p:sld>
+</file>
+
+<file path=ppt/slides/slide21.xml><?xml version="1.0" encoding="utf-8"?>
+<p:sld xmlns:a="http://schemas.openxmlformats.org/drawingml/2006/main" xmlns:r="http://schemas.openxmlformats.org/officeDocument/2006/relationships" xmlns:p="http://schemas.openxmlformats.org/presentationml/2006/main">
+  <p:cSld>
+    <p:spTree>
+      <p:nvGrpSpPr>
+        <p:cNvPr id="1" name=""/>
+        <p:cNvGrpSpPr/>
+        <p:nvPr/>
+      </p:nvGrpSpPr>
+      <p:grpSpPr>
+        <a:xfrm>
+          <a:off x="0" y="0"/>
+          <a:ext cx="0" cy="0"/>
+          <a:chOff x="0" y="0"/>
+          <a:chExt cx="0" cy="0"/>
+        </a:xfrm>
+      </p:grpSpPr>
+      <p:sp>
+        <p:nvSpPr>
+          <p:cNvPr id="2" name="Title 1"/>
+          <p:cNvSpPr>
+            <a:spLocks noGrp="1"/>
+          </p:cNvSpPr>
+          <p:nvPr>
+            <p:ph type="title"/>
+          </p:nvPr>
+        </p:nvSpPr>
+        <p:spPr/>
+        <p:txBody>
+          <a:bodyPr/>
+          <a:lstStyle/>
+          <a:p>
+            <a:r>
+              <a:rPr lang="en-US" dirty="0" smtClean="0"/>
+              <a:t>Updates</a:t>
+            </a:r>
+            <a:endParaRPr lang="en-US" dirty="0"/>
+          </a:p>
+        </p:txBody>
+      </p:sp>
+      <p:sp>
+        <p:nvSpPr>
+          <p:cNvPr id="3" name="Content Placeholder 2"/>
+          <p:cNvSpPr>
+            <a:spLocks noGrp="1"/>
+          </p:cNvSpPr>
+          <p:nvPr>
+            <p:ph idx="1"/>
+          </p:nvPr>
+        </p:nvSpPr>
+        <p:spPr/>
+        <p:txBody>
+          <a:bodyPr/>
+          <a:lstStyle/>
+          <a:p>
+            <a:r>
+              <a:rPr lang="en-US" dirty="0" smtClean="0"/>
+              <a:t>10,000 iteration </a:t>
+            </a:r>
+            <a:r>
+              <a:rPr lang="en-US" dirty="0" smtClean="0"/>
+              <a:t>results</a:t>
+            </a:r>
+          </a:p>
+          <a:p>
+            <a:r>
+              <a:rPr lang="en-US" dirty="0" err="1" smtClean="0"/>
+              <a:t>Zeisel</a:t>
+            </a:r>
+            <a:r>
+              <a:rPr lang="en-US" dirty="0" smtClean="0"/>
+              <a:t> dataset loaded</a:t>
+            </a:r>
+          </a:p>
+          <a:p>
+            <a:endParaRPr lang="en-US" dirty="0"/>
+          </a:p>
+        </p:txBody>
+      </p:sp>
+    </p:spTree>
+    <p:extLst>
+      <p:ext uri="{BB962C8B-B14F-4D97-AF65-F5344CB8AC3E}">
+        <p14:creationId xmlns:p14="http://schemas.microsoft.com/office/powerpoint/2010/main" val="2310247490"/>
+      </p:ext>
+    </p:extLst>
+  </p:cSld>
+  <p:clrMapOvr>
+    <a:masterClrMapping/>
+  </p:clrMapOvr>
+</p:sld>
+</file>
+
+<file path=ppt/slides/slide22.xml><?xml version="1.0" encoding="utf-8"?>
+<p:sld xmlns:a="http://schemas.openxmlformats.org/drawingml/2006/main" xmlns:r="http://schemas.openxmlformats.org/officeDocument/2006/relationships" xmlns:p="http://schemas.openxmlformats.org/presentationml/2006/main">
+  <p:cSld>
+    <p:spTree>
+      <p:nvGrpSpPr>
+        <p:cNvPr id="1" name=""/>
+        <p:cNvGrpSpPr/>
+        <p:nvPr/>
+      </p:nvGrpSpPr>
+      <p:grpSpPr>
+        <a:xfrm>
+          <a:off x="0" y="0"/>
+          <a:ext cx="0" cy="0"/>
+          <a:chOff x="0" y="0"/>
+          <a:chExt cx="0" cy="0"/>
+        </a:xfrm>
+      </p:grpSpPr>
+      <p:sp>
+        <p:nvSpPr>
+          <p:cNvPr id="2" name="Title 1"/>
+          <p:cNvSpPr>
+            <a:spLocks noGrp="1"/>
+          </p:cNvSpPr>
+          <p:nvPr>
+            <p:ph type="title"/>
+          </p:nvPr>
+        </p:nvSpPr>
+        <p:spPr/>
+        <p:txBody>
+          <a:bodyPr/>
+          <a:lstStyle/>
+          <a:p>
+            <a:r>
+              <a:rPr lang="en-US" dirty="0" smtClean="0"/>
+              <a:t>Results – 49 cell types</a:t>
+            </a:r>
+            <a:endParaRPr lang="en-US" dirty="0"/>
+          </a:p>
+        </p:txBody>
+      </p:sp>
+      <p:pic>
+        <p:nvPicPr>
+          <p:cNvPr id="3" name="Picture 2"/>
+          <p:cNvPicPr>
+            <a:picLocks noChangeAspect="1"/>
+          </p:cNvPicPr>
+          <p:nvPr/>
+        </p:nvPicPr>
+        <p:blipFill>
+          <a:blip r:embed="rId2"/>
+          <a:stretch>
+            <a:fillRect/>
+          </a:stretch>
+        </p:blipFill>
+        <p:spPr>
+          <a:xfrm>
+            <a:off x="0" y="1562100"/>
+            <a:ext cx="9144000" cy="3731772"/>
+          </a:xfrm>
+          <a:prstGeom prst="rect">
+            <a:avLst/>
+          </a:prstGeom>
+        </p:spPr>
+      </p:pic>
+    </p:spTree>
+    <p:extLst>
+      <p:ext uri="{BB962C8B-B14F-4D97-AF65-F5344CB8AC3E}">
+        <p14:creationId xmlns:p14="http://schemas.microsoft.com/office/powerpoint/2010/main" val="2241634748"/>
+      </p:ext>
+    </p:extLst>
+  </p:cSld>
+  <p:clrMapOvr>
+    <a:masterClrMapping/>
+  </p:clrMapOvr>
+</p:sld>
+</file>
+
+<file path=ppt/slides/slide23.xml><?xml version="1.0" encoding="utf-8"?>
+<p:sld xmlns:a="http://schemas.openxmlformats.org/drawingml/2006/main" xmlns:r="http://schemas.openxmlformats.org/officeDocument/2006/relationships" xmlns:p="http://schemas.openxmlformats.org/presentationml/2006/main">
+  <p:cSld>
+    <p:spTree>
+      <p:nvGrpSpPr>
+        <p:cNvPr id="1" name=""/>
+        <p:cNvGrpSpPr/>
+        <p:nvPr/>
+      </p:nvGrpSpPr>
+      <p:grpSpPr>
+        <a:xfrm>
+          <a:off x="0" y="0"/>
+          <a:ext cx="0" cy="0"/>
+          <a:chOff x="0" y="0"/>
+          <a:chExt cx="0" cy="0"/>
+        </a:xfrm>
+      </p:grpSpPr>
+      <p:sp>
+        <p:nvSpPr>
+          <p:cNvPr id="2" name="Title 1"/>
+          <p:cNvSpPr>
+            <a:spLocks noGrp="1"/>
+          </p:cNvSpPr>
+          <p:nvPr>
+            <p:ph type="title"/>
+          </p:nvPr>
+        </p:nvSpPr>
+        <p:spPr/>
+        <p:txBody>
+          <a:bodyPr>
+            <a:normAutofit/>
+          </a:bodyPr>
+          <a:lstStyle/>
+          <a:p>
+            <a:r>
+              <a:rPr lang="en-US" sz="3200" dirty="0" smtClean="0"/>
+              <a:t>Results, alternate aging list (</a:t>
+            </a:r>
+            <a:r>
+              <a:rPr lang="en-US" sz="3200" dirty="0" err="1" smtClean="0"/>
+              <a:t>Mistry</a:t>
+            </a:r>
+            <a:r>
+              <a:rPr lang="en-US" sz="3200" dirty="0" smtClean="0"/>
+              <a:t> and </a:t>
+            </a:r>
+            <a:r>
+              <a:rPr lang="en-US" sz="3200" dirty="0" err="1" smtClean="0"/>
+              <a:t>Pavlidis</a:t>
+            </a:r>
+            <a:r>
+              <a:rPr lang="en-US" sz="3200" dirty="0" smtClean="0"/>
+              <a:t>)</a:t>
+            </a:r>
+            <a:endParaRPr lang="en-US" sz="3200" dirty="0"/>
+          </a:p>
+        </p:txBody>
+      </p:sp>
+      <p:pic>
+        <p:nvPicPr>
+          <p:cNvPr id="4" name="Picture 3"/>
+          <p:cNvPicPr>
+            <a:picLocks noChangeAspect="1"/>
+          </p:cNvPicPr>
+          <p:nvPr/>
+        </p:nvPicPr>
+        <p:blipFill>
+          <a:blip r:embed="rId2"/>
+          <a:stretch>
+            <a:fillRect/>
+          </a:stretch>
+        </p:blipFill>
+        <p:spPr>
+          <a:xfrm>
+            <a:off x="0" y="1295400"/>
+            <a:ext cx="9144000" cy="4245429"/>
+          </a:xfrm>
+          <a:prstGeom prst="rect">
+            <a:avLst/>
+          </a:prstGeom>
+        </p:spPr>
+      </p:pic>
+    </p:spTree>
+    <p:extLst>
+      <p:ext uri="{BB962C8B-B14F-4D97-AF65-F5344CB8AC3E}">
+        <p14:creationId xmlns:p14="http://schemas.microsoft.com/office/powerpoint/2010/main" val="2061672287"/>
+      </p:ext>
+    </p:extLst>
+  </p:cSld>
+  <p:clrMapOvr>
+    <a:masterClrMapping/>
+  </p:clrMapOvr>
+</p:sld>
+</file>
+
+<file path=ppt/slides/slide24.xml><?xml version="1.0" encoding="utf-8"?>
+<p:sld xmlns:a="http://schemas.openxmlformats.org/drawingml/2006/main" xmlns:r="http://schemas.openxmlformats.org/officeDocument/2006/relationships" xmlns:p="http://schemas.openxmlformats.org/presentationml/2006/main">
+  <p:cSld>
+    <p:spTree>
+      <p:nvGrpSpPr>
+        <p:cNvPr id="1" name=""/>
+        <p:cNvGrpSpPr/>
+        <p:nvPr/>
+      </p:nvGrpSpPr>
+      <p:grpSpPr>
+        <a:xfrm>
+          <a:off x="0" y="0"/>
+          <a:ext cx="0" cy="0"/>
+          <a:chOff x="0" y="0"/>
+          <a:chExt cx="0" cy="0"/>
+        </a:xfrm>
+      </p:grpSpPr>
+      <p:sp>
+        <p:nvSpPr>
+          <p:cNvPr id="2" name="Title 1"/>
+          <p:cNvSpPr>
+            <a:spLocks noGrp="1"/>
+          </p:cNvSpPr>
+          <p:nvPr>
+            <p:ph type="title"/>
+          </p:nvPr>
+        </p:nvSpPr>
+        <p:spPr/>
+        <p:txBody>
+          <a:bodyPr>
+            <a:normAutofit/>
+          </a:bodyPr>
+          <a:lstStyle/>
+          <a:p>
+            <a:r>
+              <a:rPr lang="en-US" dirty="0" smtClean="0"/>
+              <a:t>Blood aging list</a:t>
+            </a:r>
+            <a:br>
+              <a:rPr lang="en-US" dirty="0" smtClean="0"/>
+            </a:br>
+            <a:r>
+              <a:rPr lang="en-US" sz="1800" dirty="0" smtClean="0"/>
+              <a:t>The transcriptional landscape of age in human peripheral blood, Peters et al., 2015</a:t>
+            </a:r>
+            <a:endParaRPr lang="en-US" sz="1800" dirty="0"/>
+          </a:p>
+        </p:txBody>
+      </p:sp>
+      <p:pic>
+        <p:nvPicPr>
+          <p:cNvPr id="4" name="Picture 3"/>
+          <p:cNvPicPr>
+            <a:picLocks noChangeAspect="1"/>
+          </p:cNvPicPr>
+          <p:nvPr/>
+        </p:nvPicPr>
+        <p:blipFill>
+          <a:blip r:embed="rId2"/>
+          <a:stretch>
+            <a:fillRect/>
+          </a:stretch>
+        </p:blipFill>
+        <p:spPr>
+          <a:xfrm>
+            <a:off x="0" y="1549400"/>
+            <a:ext cx="9144000" cy="3750787"/>
+          </a:xfrm>
+          <a:prstGeom prst="rect">
+            <a:avLst/>
+          </a:prstGeom>
+        </p:spPr>
+      </p:pic>
+    </p:spTree>
+    <p:extLst>
+      <p:ext uri="{BB962C8B-B14F-4D97-AF65-F5344CB8AC3E}">
+        <p14:creationId xmlns:p14="http://schemas.microsoft.com/office/powerpoint/2010/main" val="3555295600"/>
+      </p:ext>
+    </p:extLst>
+  </p:cSld>
+  <p:clrMapOvr>
+    <a:masterClrMapping/>
+  </p:clrMapOvr>
+</p:sld>
+</file>
+
+<file path=ppt/slides/slide25.xml><?xml version="1.0" encoding="utf-8"?>
+<p:sld xmlns:a="http://schemas.openxmlformats.org/drawingml/2006/main" xmlns:r="http://schemas.openxmlformats.org/officeDocument/2006/relationships" xmlns:p="http://schemas.openxmlformats.org/presentationml/2006/main">
+  <p:cSld>
+    <p:spTree>
+      <p:nvGrpSpPr>
+        <p:cNvPr id="1" name=""/>
+        <p:cNvGrpSpPr/>
+        <p:nvPr/>
+      </p:nvGrpSpPr>
+      <p:grpSpPr>
+        <a:xfrm>
+          <a:off x="0" y="0"/>
+          <a:ext cx="0" cy="0"/>
+          <a:chOff x="0" y="0"/>
+          <a:chExt cx="0" cy="0"/>
+        </a:xfrm>
+      </p:grpSpPr>
+      <p:sp>
+        <p:nvSpPr>
+          <p:cNvPr id="2" name="Title 1"/>
+          <p:cNvSpPr>
+            <a:spLocks noGrp="1"/>
+          </p:cNvSpPr>
+          <p:nvPr>
+            <p:ph type="title"/>
+          </p:nvPr>
+        </p:nvSpPr>
+        <p:spPr/>
+        <p:txBody>
+          <a:bodyPr/>
+          <a:lstStyle/>
+          <a:p>
+            <a:r>
+              <a:rPr lang="en-US" dirty="0" smtClean="0"/>
+              <a:t>Results – </a:t>
+            </a:r>
+            <a:r>
+              <a:rPr lang="en-US" dirty="0" smtClean="0"/>
+              <a:t>4 </a:t>
+            </a:r>
+            <a:r>
+              <a:rPr lang="en-US" dirty="0" smtClean="0"/>
+              <a:t>cell types</a:t>
+            </a:r>
+            <a:endParaRPr lang="en-US" dirty="0"/>
+          </a:p>
+        </p:txBody>
+      </p:sp>
+      <p:pic>
+        <p:nvPicPr>
+          <p:cNvPr id="3" name="Picture 2"/>
+          <p:cNvPicPr>
+            <a:picLocks noChangeAspect="1"/>
+          </p:cNvPicPr>
+          <p:nvPr/>
+        </p:nvPicPr>
+        <p:blipFill>
+          <a:blip r:embed="rId2"/>
+          <a:stretch>
+            <a:fillRect/>
+          </a:stretch>
+        </p:blipFill>
+        <p:spPr>
+          <a:xfrm>
+            <a:off x="0" y="2641600"/>
+            <a:ext cx="9144000" cy="1557173"/>
+          </a:xfrm>
+          <a:prstGeom prst="rect">
+            <a:avLst/>
+          </a:prstGeom>
+        </p:spPr>
+      </p:pic>
+    </p:spTree>
+    <p:extLst>
+      <p:ext uri="{BB962C8B-B14F-4D97-AF65-F5344CB8AC3E}">
+        <p14:creationId xmlns:p14="http://schemas.microsoft.com/office/powerpoint/2010/main" val="2241634748"/>
+      </p:ext>
+    </p:extLst>
+  </p:cSld>
+  <p:clrMapOvr>
+    <a:masterClrMapping/>
+  </p:clrMapOvr>
+</p:sld>
+</file>
+
+<file path=ppt/slides/slide26.xml><?xml version="1.0" encoding="utf-8"?>
+<p:sld xmlns:a="http://schemas.openxmlformats.org/drawingml/2006/main" xmlns:r="http://schemas.openxmlformats.org/officeDocument/2006/relationships" xmlns:p="http://schemas.openxmlformats.org/presentationml/2006/main">
+  <p:cSld>
+    <p:spTree>
+      <p:nvGrpSpPr>
+        <p:cNvPr id="1" name=""/>
+        <p:cNvGrpSpPr/>
+        <p:nvPr/>
+      </p:nvGrpSpPr>
+      <p:grpSpPr>
+        <a:xfrm>
+          <a:off x="0" y="0"/>
+          <a:ext cx="0" cy="0"/>
+          <a:chOff x="0" y="0"/>
+          <a:chExt cx="0" cy="0"/>
+        </a:xfrm>
+      </p:grpSpPr>
+      <p:sp>
+        <p:nvSpPr>
+          <p:cNvPr id="2" name="Title 1"/>
+          <p:cNvSpPr>
+            <a:spLocks noGrp="1"/>
+          </p:cNvSpPr>
+          <p:nvPr>
+            <p:ph type="title"/>
+          </p:nvPr>
+        </p:nvSpPr>
+        <p:spPr/>
+        <p:txBody>
+          <a:bodyPr>
+            <a:normAutofit/>
+          </a:bodyPr>
+          <a:lstStyle/>
+          <a:p>
+            <a:r>
+              <a:rPr lang="en-US" sz="3200" dirty="0" smtClean="0"/>
+              <a:t>Results, alternate aging list (</a:t>
+            </a:r>
+            <a:r>
+              <a:rPr lang="en-US" sz="3200" dirty="0" err="1" smtClean="0"/>
+              <a:t>Mistry</a:t>
+            </a:r>
+            <a:r>
+              <a:rPr lang="en-US" sz="3200" dirty="0" smtClean="0"/>
+              <a:t> and </a:t>
+            </a:r>
+            <a:r>
+              <a:rPr lang="en-US" sz="3200" dirty="0" err="1" smtClean="0"/>
+              <a:t>Pavlidis</a:t>
+            </a:r>
+            <a:r>
+              <a:rPr lang="en-US" sz="3200" dirty="0" smtClean="0"/>
+              <a:t>)</a:t>
+            </a:r>
+            <a:endParaRPr lang="en-US" sz="3200" dirty="0"/>
+          </a:p>
+        </p:txBody>
+      </p:sp>
+      <p:pic>
+        <p:nvPicPr>
+          <p:cNvPr id="3" name="Picture 2"/>
+          <p:cNvPicPr>
+            <a:picLocks noChangeAspect="1"/>
+          </p:cNvPicPr>
+          <p:nvPr/>
+        </p:nvPicPr>
+        <p:blipFill>
+          <a:blip r:embed="rId2"/>
+          <a:stretch>
+            <a:fillRect/>
+          </a:stretch>
+        </p:blipFill>
+        <p:spPr>
+          <a:xfrm>
+            <a:off x="0" y="2628900"/>
+            <a:ext cx="9144000" cy="1586204"/>
+          </a:xfrm>
+          <a:prstGeom prst="rect">
+            <a:avLst/>
+          </a:prstGeom>
+        </p:spPr>
+      </p:pic>
+    </p:spTree>
+    <p:extLst>
+      <p:ext uri="{BB962C8B-B14F-4D97-AF65-F5344CB8AC3E}">
+        <p14:creationId xmlns:p14="http://schemas.microsoft.com/office/powerpoint/2010/main" val="20917964"/>
+      </p:ext>
+    </p:extLst>
+  </p:cSld>
+  <p:clrMapOvr>
+    <a:masterClrMapping/>
+  </p:clrMapOvr>
+</p:sld>
+</file>
+
+<file path=ppt/slides/slide27.xml><?xml version="1.0" encoding="utf-8"?>
+<p:sld xmlns:a="http://schemas.openxmlformats.org/drawingml/2006/main" xmlns:r="http://schemas.openxmlformats.org/officeDocument/2006/relationships" xmlns:p="http://schemas.openxmlformats.org/presentationml/2006/main">
+  <p:cSld>
+    <p:spTree>
+      <p:nvGrpSpPr>
+        <p:cNvPr id="1" name=""/>
+        <p:cNvGrpSpPr/>
+        <p:nvPr/>
+      </p:nvGrpSpPr>
+      <p:grpSpPr>
+        <a:xfrm>
+          <a:off x="0" y="0"/>
+          <a:ext cx="0" cy="0"/>
+          <a:chOff x="0" y="0"/>
+          <a:chExt cx="0" cy="0"/>
+        </a:xfrm>
+      </p:grpSpPr>
+      <p:sp>
+        <p:nvSpPr>
+          <p:cNvPr id="2" name="Title 1"/>
+          <p:cNvSpPr>
+            <a:spLocks noGrp="1"/>
+          </p:cNvSpPr>
+          <p:nvPr>
+            <p:ph type="title"/>
+          </p:nvPr>
+        </p:nvSpPr>
+        <p:spPr/>
+        <p:txBody>
+          <a:bodyPr>
+            <a:normAutofit/>
+          </a:bodyPr>
+          <a:lstStyle/>
+          <a:p>
+            <a:r>
+              <a:rPr lang="en-US" dirty="0" smtClean="0"/>
+              <a:t>Blood aging list</a:t>
+            </a:r>
+            <a:br>
+              <a:rPr lang="en-US" dirty="0" smtClean="0"/>
+            </a:br>
+            <a:r>
+              <a:rPr lang="en-US" sz="1800" dirty="0" smtClean="0"/>
+              <a:t>The transcriptional landscape of age in human peripheral blood, Peters et al., 2015</a:t>
+            </a:r>
+            <a:endParaRPr lang="en-US" sz="1800" dirty="0"/>
+          </a:p>
+        </p:txBody>
+      </p:sp>
+      <p:pic>
+        <p:nvPicPr>
+          <p:cNvPr id="4" name="Picture 3"/>
+          <p:cNvPicPr>
+            <a:picLocks noChangeAspect="1"/>
+          </p:cNvPicPr>
+          <p:nvPr/>
+        </p:nvPicPr>
+        <p:blipFill>
+          <a:blip r:embed="rId2"/>
+          <a:stretch>
+            <a:fillRect/>
+          </a:stretch>
+        </p:blipFill>
+        <p:spPr>
+          <a:xfrm>
+            <a:off x="0" y="2641600"/>
+            <a:ext cx="9144000" cy="1558901"/>
+          </a:xfrm>
+          <a:prstGeom prst="rect">
+            <a:avLst/>
+          </a:prstGeom>
+        </p:spPr>
+      </p:pic>
+    </p:spTree>
+    <p:extLst>
+      <p:ext uri="{BB962C8B-B14F-4D97-AF65-F5344CB8AC3E}">
+        <p14:creationId xmlns:p14="http://schemas.microsoft.com/office/powerpoint/2010/main" val="3555295600"/>
+      </p:ext>
+    </p:extLst>
+  </p:cSld>
+  <p:clrMapOvr>
+    <a:masterClrMapping/>
+  </p:clrMapOvr>
+</p:sld>
+</file>
+
+<file path=ppt/slides/slide28.xml><?xml version="1.0" encoding="utf-8"?>
+<p:sld xmlns:a="http://schemas.openxmlformats.org/drawingml/2006/main" xmlns:r="http://schemas.openxmlformats.org/officeDocument/2006/relationships" xmlns:p="http://schemas.openxmlformats.org/presentationml/2006/main">
+  <p:cSld>
+    <p:spTree>
+      <p:nvGrpSpPr>
+        <p:cNvPr id="1" name=""/>
+        <p:cNvGrpSpPr/>
+        <p:nvPr/>
+      </p:nvGrpSpPr>
+      <p:grpSpPr>
+        <a:xfrm>
+          <a:off x="0" y="0"/>
+          <a:ext cx="0" cy="0"/>
+          <a:chOff x="0" y="0"/>
+          <a:chExt cx="0" cy="0"/>
+        </a:xfrm>
+      </p:grpSpPr>
+      <p:sp>
+        <p:nvSpPr>
+          <p:cNvPr id="2" name="Title 1"/>
+          <p:cNvSpPr>
+            <a:spLocks noGrp="1"/>
+          </p:cNvSpPr>
+          <p:nvPr>
+            <p:ph type="title"/>
+          </p:nvPr>
+        </p:nvSpPr>
+        <p:spPr/>
+        <p:txBody>
+          <a:bodyPr/>
+          <a:lstStyle/>
+          <a:p>
+            <a:r>
+              <a:rPr lang="en-US" dirty="0" err="1" smtClean="0"/>
+              <a:t>Zeisel</a:t>
+            </a:r>
+            <a:r>
+              <a:rPr lang="en-US" dirty="0" smtClean="0"/>
+              <a:t> single cell sequencing</a:t>
+            </a:r>
+            <a:endParaRPr lang="en-US" dirty="0"/>
+          </a:p>
+        </p:txBody>
+      </p:sp>
+      <p:sp>
+        <p:nvSpPr>
+          <p:cNvPr id="3" name="Content Placeholder 2"/>
+          <p:cNvSpPr>
+            <a:spLocks noGrp="1"/>
+          </p:cNvSpPr>
+          <p:nvPr>
+            <p:ph idx="1"/>
+          </p:nvPr>
+        </p:nvSpPr>
+        <p:spPr/>
+        <p:txBody>
+          <a:bodyPr/>
+          <a:lstStyle/>
+          <a:p>
+            <a:endParaRPr lang="en-US"/>
+          </a:p>
+        </p:txBody>
+      </p:sp>
+    </p:spTree>
+    <p:extLst>
+      <p:ext uri="{BB962C8B-B14F-4D97-AF65-F5344CB8AC3E}">
+        <p14:creationId xmlns:p14="http://schemas.microsoft.com/office/powerpoint/2010/main" val="1669815200"/>
+      </p:ext>
+    </p:extLst>
+  </p:cSld>
+  <p:clrMapOvr>
+    <a:masterClrMapping/>
+  </p:clrMapOvr>
+</p:sld>
+</file>
+
+<file path=ppt/slides/slide29.xml><?xml version="1.0" encoding="utf-8"?>
+<p:sld xmlns:a="http://schemas.openxmlformats.org/drawingml/2006/main" xmlns:r="http://schemas.openxmlformats.org/officeDocument/2006/relationships" xmlns:p="http://schemas.openxmlformats.org/presentationml/2006/main">
+  <p:cSld>
+    <p:spTree>
+      <p:nvGrpSpPr>
+        <p:cNvPr id="1" name=""/>
+        <p:cNvGrpSpPr/>
+        <p:nvPr/>
+      </p:nvGrpSpPr>
+      <p:grpSpPr>
+        <a:xfrm>
+          <a:off x="0" y="0"/>
+          <a:ext cx="0" cy="0"/>
+          <a:chOff x="0" y="0"/>
+          <a:chExt cx="0" cy="0"/>
+        </a:xfrm>
+      </p:grpSpPr>
+      <p:sp>
+        <p:nvSpPr>
+          <p:cNvPr id="2" name="Title 1"/>
+          <p:cNvSpPr>
+            <a:spLocks noGrp="1"/>
+          </p:cNvSpPr>
+          <p:nvPr>
+            <p:ph type="title"/>
+          </p:nvPr>
+        </p:nvSpPr>
+        <p:spPr/>
+        <p:txBody>
+          <a:bodyPr>
+            <a:normAutofit fontScale="90000"/>
+          </a:bodyPr>
+          <a:lstStyle/>
+          <a:p>
+            <a:r>
+              <a:rPr lang="en-US" dirty="0" smtClean="0"/>
+              <a:t>Cell types in the mouse cortex and hippocampus revealed by single-cell RNA-</a:t>
+            </a:r>
+            <a:r>
+              <a:rPr lang="en-US" dirty="0" err="1" smtClean="0"/>
+              <a:t>seq</a:t>
+            </a:r>
+            <a:endParaRPr lang="en-US" dirty="0"/>
+          </a:p>
+        </p:txBody>
+      </p:sp>
+      <p:sp>
+        <p:nvSpPr>
+          <p:cNvPr id="3" name="Content Placeholder 2"/>
+          <p:cNvSpPr>
+            <a:spLocks noGrp="1"/>
+          </p:cNvSpPr>
+          <p:nvPr>
+            <p:ph idx="1"/>
+          </p:nvPr>
+        </p:nvSpPr>
+        <p:spPr>
+          <a:xfrm>
+            <a:off x="457200" y="1798004"/>
+            <a:ext cx="8229600" cy="4525963"/>
+          </a:xfrm>
+        </p:spPr>
+        <p:txBody>
+          <a:bodyPr/>
+          <a:lstStyle/>
+          <a:p>
+            <a:r>
+              <a:rPr lang="en-US" dirty="0" smtClean="0"/>
+              <a:t>Published Feb 2015 in Science</a:t>
+            </a:r>
+          </a:p>
+          <a:p>
+            <a:r>
+              <a:rPr lang="en-US" dirty="0" err="1" smtClean="0"/>
+              <a:t>Zeisel</a:t>
+            </a:r>
+            <a:r>
+              <a:rPr lang="en-US" dirty="0" smtClean="0"/>
+              <a:t>, Muñoz-</a:t>
+            </a:r>
+            <a:r>
+              <a:rPr lang="en-US" dirty="0" err="1" smtClean="0"/>
+              <a:t>Manchado</a:t>
+            </a:r>
+            <a:r>
+              <a:rPr lang="en-US" dirty="0" smtClean="0"/>
+              <a:t>, et al. (Stockholm, Sweden)</a:t>
+            </a:r>
+          </a:p>
+          <a:p>
+            <a:r>
+              <a:rPr lang="en-US" dirty="0" smtClean="0"/>
+              <a:t>used single-cell RNA sequencing (RNA-</a:t>
+            </a:r>
+            <a:r>
+              <a:rPr lang="en-US" dirty="0" err="1" smtClean="0"/>
+              <a:t>seq</a:t>
+            </a:r>
+            <a:r>
+              <a:rPr lang="en-US" dirty="0" smtClean="0"/>
+              <a:t>) to classify cells in the mouse brain</a:t>
+            </a:r>
+            <a:endParaRPr lang="en-US" dirty="0"/>
+          </a:p>
+        </p:txBody>
+      </p:sp>
+    </p:spTree>
+    <p:extLst>
+      <p:ext uri="{BB962C8B-B14F-4D97-AF65-F5344CB8AC3E}">
+        <p14:creationId xmlns:p14="http://schemas.microsoft.com/office/powerpoint/2010/main" val="3298416039"/>
+      </p:ext>
+    </p:extLst>
+  </p:cSld>
+  <p:clrMapOvr>
+    <a:masterClrMapping/>
+  </p:clrMapOvr>
+</p:sld>
+</file>
+
 <file path=ppt/slides/slide3.xml><?xml version="1.0" encoding="utf-8"?>
 <p:sld xmlns:a="http://schemas.openxmlformats.org/drawingml/2006/main" xmlns:r="http://schemas.openxmlformats.org/officeDocument/2006/relationships" xmlns:p="http://schemas.openxmlformats.org/presentationml/2006/main">
   <p:cSld>
@@ -4510,6 +5458,735 @@
     <p:extLst>
       <p:ext uri="{BB962C8B-B14F-4D97-AF65-F5344CB8AC3E}">
         <p14:creationId xmlns:p14="http://schemas.microsoft.com/office/powerpoint/2010/main" val="3303625771"/>
+      </p:ext>
+    </p:extLst>
+  </p:cSld>
+  <p:clrMapOvr>
+    <a:masterClrMapping/>
+  </p:clrMapOvr>
+</p:sld>
+</file>
+
+<file path=ppt/slides/slide30.xml><?xml version="1.0" encoding="utf-8"?>
+<p:sld xmlns:a="http://schemas.openxmlformats.org/drawingml/2006/main" xmlns:r="http://schemas.openxmlformats.org/officeDocument/2006/relationships" xmlns:p="http://schemas.openxmlformats.org/presentationml/2006/main">
+  <p:cSld>
+    <p:spTree>
+      <p:nvGrpSpPr>
+        <p:cNvPr id="1" name=""/>
+        <p:cNvGrpSpPr/>
+        <p:nvPr/>
+      </p:nvGrpSpPr>
+      <p:grpSpPr>
+        <a:xfrm>
+          <a:off x="0" y="0"/>
+          <a:ext cx="0" cy="0"/>
+          <a:chOff x="0" y="0"/>
+          <a:chExt cx="0" cy="0"/>
+        </a:xfrm>
+      </p:grpSpPr>
+      <p:sp>
+        <p:nvSpPr>
+          <p:cNvPr id="2" name="Title 1"/>
+          <p:cNvSpPr>
+            <a:spLocks noGrp="1"/>
+          </p:cNvSpPr>
+          <p:nvPr>
+            <p:ph type="title"/>
+          </p:nvPr>
+        </p:nvSpPr>
+        <p:spPr/>
+        <p:txBody>
+          <a:bodyPr/>
+          <a:lstStyle/>
+          <a:p>
+            <a:r>
+              <a:rPr lang="en-US" dirty="0" smtClean="0"/>
+              <a:t>Mouse brain details</a:t>
+            </a:r>
+            <a:endParaRPr lang="en-US" dirty="0"/>
+          </a:p>
+        </p:txBody>
+      </p:sp>
+      <p:sp>
+        <p:nvSpPr>
+          <p:cNvPr id="3" name="Content Placeholder 2"/>
+          <p:cNvSpPr>
+            <a:spLocks noGrp="1"/>
+          </p:cNvSpPr>
+          <p:nvPr>
+            <p:ph idx="1"/>
+          </p:nvPr>
+        </p:nvSpPr>
+        <p:spPr/>
+        <p:txBody>
+          <a:bodyPr>
+            <a:normAutofit/>
+          </a:bodyPr>
+          <a:lstStyle/>
+          <a:p>
+            <a:endParaRPr lang="en-US" dirty="0" smtClean="0"/>
+          </a:p>
+          <a:p>
+            <a:r>
+              <a:rPr lang="en-US" dirty="0" smtClean="0"/>
+              <a:t>Mice between postnatal 21 and 31 days of both sexes</a:t>
+            </a:r>
+          </a:p>
+          <a:p>
+            <a:r>
+              <a:rPr lang="en-US" dirty="0" smtClean="0"/>
+              <a:t>Regions: hippocampal CA1 and somatosensory cortex</a:t>
+            </a:r>
+          </a:p>
+          <a:p>
+            <a:r>
+              <a:rPr lang="en-US" dirty="0" smtClean="0"/>
+              <a:t>3005 single-cell </a:t>
+            </a:r>
+            <a:r>
+              <a:rPr lang="en-US" dirty="0" err="1" smtClean="0"/>
+              <a:t>transcriptomes</a:t>
+            </a:r>
+            <a:endParaRPr lang="en-US" dirty="0" smtClean="0"/>
+          </a:p>
+          <a:p>
+            <a:r>
+              <a:rPr lang="en-US" dirty="0" smtClean="0"/>
+              <a:t>9 main clusters, 47 subclasses</a:t>
+            </a:r>
+            <a:endParaRPr lang="en-US" dirty="0" smtClean="0"/>
+          </a:p>
+          <a:p>
+            <a:pPr marL="0" indent="0">
+              <a:buNone/>
+            </a:pPr>
+            <a:endParaRPr lang="en-US" dirty="0"/>
+          </a:p>
+        </p:txBody>
+      </p:sp>
+    </p:spTree>
+    <p:extLst>
+      <p:ext uri="{BB962C8B-B14F-4D97-AF65-F5344CB8AC3E}">
+        <p14:creationId xmlns:p14="http://schemas.microsoft.com/office/powerpoint/2010/main" val="1730455368"/>
+      </p:ext>
+    </p:extLst>
+  </p:cSld>
+  <p:clrMapOvr>
+    <a:masterClrMapping/>
+  </p:clrMapOvr>
+</p:sld>
+</file>
+
+<file path=ppt/slides/slide31.xml><?xml version="1.0" encoding="utf-8"?>
+<p:sld xmlns:a="http://schemas.openxmlformats.org/drawingml/2006/main" xmlns:r="http://schemas.openxmlformats.org/officeDocument/2006/relationships" xmlns:p="http://schemas.openxmlformats.org/presentationml/2006/main">
+  <p:cSld>
+    <p:spTree>
+      <p:nvGrpSpPr>
+        <p:cNvPr id="1" name=""/>
+        <p:cNvGrpSpPr/>
+        <p:nvPr/>
+      </p:nvGrpSpPr>
+      <p:grpSpPr>
+        <a:xfrm>
+          <a:off x="0" y="0"/>
+          <a:ext cx="0" cy="0"/>
+          <a:chOff x="0" y="0"/>
+          <a:chExt cx="0" cy="0"/>
+        </a:xfrm>
+      </p:grpSpPr>
+      <p:pic>
+        <p:nvPicPr>
+          <p:cNvPr id="6" name="Picture 5"/>
+          <p:cNvPicPr>
+            <a:picLocks noChangeAspect="1"/>
+          </p:cNvPicPr>
+          <p:nvPr/>
+        </p:nvPicPr>
+        <p:blipFill rotWithShape="1">
+          <a:blip r:embed="rId2"/>
+          <a:srcRect r="43651" b="55358"/>
+          <a:stretch/>
+        </p:blipFill>
+        <p:spPr>
+          <a:xfrm>
+            <a:off x="36285" y="1481665"/>
+            <a:ext cx="8943760" cy="3138714"/>
+          </a:xfrm>
+          <a:prstGeom prst="rect">
+            <a:avLst/>
+          </a:prstGeom>
+        </p:spPr>
+      </p:pic>
+    </p:spTree>
+    <p:extLst>
+      <p:ext uri="{BB962C8B-B14F-4D97-AF65-F5344CB8AC3E}">
+        <p14:creationId xmlns:p14="http://schemas.microsoft.com/office/powerpoint/2010/main" val="3520886803"/>
+      </p:ext>
+    </p:extLst>
+  </p:cSld>
+  <p:clrMapOvr>
+    <a:masterClrMapping/>
+  </p:clrMapOvr>
+</p:sld>
+</file>
+
+<file path=ppt/slides/slide32.xml><?xml version="1.0" encoding="utf-8"?>
+<p:sld xmlns:a="http://schemas.openxmlformats.org/drawingml/2006/main" xmlns:r="http://schemas.openxmlformats.org/officeDocument/2006/relationships" xmlns:p="http://schemas.openxmlformats.org/presentationml/2006/main">
+  <p:cSld>
+    <p:spTree>
+      <p:nvGrpSpPr>
+        <p:cNvPr id="1" name=""/>
+        <p:cNvGrpSpPr/>
+        <p:nvPr/>
+      </p:nvGrpSpPr>
+      <p:grpSpPr>
+        <a:xfrm>
+          <a:off x="0" y="0"/>
+          <a:ext cx="0" cy="0"/>
+          <a:chOff x="0" y="0"/>
+          <a:chExt cx="0" cy="0"/>
+        </a:xfrm>
+      </p:grpSpPr>
+      <p:sp>
+        <p:nvSpPr>
+          <p:cNvPr id="2" name="Title 1"/>
+          <p:cNvSpPr>
+            <a:spLocks noGrp="1"/>
+          </p:cNvSpPr>
+          <p:nvPr>
+            <p:ph type="title"/>
+          </p:nvPr>
+        </p:nvSpPr>
+        <p:spPr/>
+        <p:txBody>
+          <a:bodyPr>
+            <a:normAutofit fontScale="90000"/>
+          </a:bodyPr>
+          <a:lstStyle/>
+          <a:p>
+            <a:r>
+              <a:rPr lang="en-US" dirty="0" err="1" smtClean="0"/>
+              <a:t>Zeisel</a:t>
+            </a:r>
+            <a:r>
+              <a:rPr lang="en-US" dirty="0" smtClean="0"/>
+              <a:t> main cell types – our aging list</a:t>
+            </a:r>
+            <a:endParaRPr lang="en-US" dirty="0"/>
+          </a:p>
+        </p:txBody>
+      </p:sp>
+      <p:pic>
+        <p:nvPicPr>
+          <p:cNvPr id="4" name="Picture 3"/>
+          <p:cNvPicPr>
+            <a:picLocks noChangeAspect="1"/>
+          </p:cNvPicPr>
+          <p:nvPr/>
+        </p:nvPicPr>
+        <p:blipFill>
+          <a:blip r:embed="rId2"/>
+          <a:stretch>
+            <a:fillRect/>
+          </a:stretch>
+        </p:blipFill>
+        <p:spPr>
+          <a:xfrm>
+            <a:off x="0" y="2311400"/>
+            <a:ext cx="9144000" cy="2224533"/>
+          </a:xfrm>
+          <a:prstGeom prst="rect">
+            <a:avLst/>
+          </a:prstGeom>
+        </p:spPr>
+      </p:pic>
+    </p:spTree>
+    <p:extLst>
+      <p:ext uri="{BB962C8B-B14F-4D97-AF65-F5344CB8AC3E}">
+        <p14:creationId xmlns:p14="http://schemas.microsoft.com/office/powerpoint/2010/main" val="1010044100"/>
+      </p:ext>
+    </p:extLst>
+  </p:cSld>
+  <p:clrMapOvr>
+    <a:masterClrMapping/>
+  </p:clrMapOvr>
+</p:sld>
+</file>
+
+<file path=ppt/slides/slide33.xml><?xml version="1.0" encoding="utf-8"?>
+<p:sld xmlns:a="http://schemas.openxmlformats.org/drawingml/2006/main" xmlns:r="http://schemas.openxmlformats.org/officeDocument/2006/relationships" xmlns:p="http://schemas.openxmlformats.org/presentationml/2006/main">
+  <p:cSld>
+    <p:spTree>
+      <p:nvGrpSpPr>
+        <p:cNvPr id="1" name=""/>
+        <p:cNvGrpSpPr/>
+        <p:nvPr/>
+      </p:nvGrpSpPr>
+      <p:grpSpPr>
+        <a:xfrm>
+          <a:off x="0" y="0"/>
+          <a:ext cx="0" cy="0"/>
+          <a:chOff x="0" y="0"/>
+          <a:chExt cx="0" cy="0"/>
+        </a:xfrm>
+      </p:grpSpPr>
+      <p:sp>
+        <p:nvSpPr>
+          <p:cNvPr id="2" name="Title 1"/>
+          <p:cNvSpPr>
+            <a:spLocks noGrp="1"/>
+          </p:cNvSpPr>
+          <p:nvPr>
+            <p:ph type="title"/>
+          </p:nvPr>
+        </p:nvSpPr>
+        <p:spPr>
+          <a:xfrm>
+            <a:off x="457200" y="26830"/>
+            <a:ext cx="8229600" cy="1143000"/>
+          </a:xfrm>
+        </p:spPr>
+        <p:txBody>
+          <a:bodyPr/>
+          <a:lstStyle/>
+          <a:p>
+            <a:r>
+              <a:rPr lang="en-US" dirty="0" err="1" smtClean="0"/>
+              <a:t>Zeisel</a:t>
+            </a:r>
+            <a:r>
+              <a:rPr lang="en-US" dirty="0" smtClean="0"/>
+              <a:t> all cell types, our aging list</a:t>
+            </a:r>
+            <a:endParaRPr lang="en-US" dirty="0"/>
+          </a:p>
+        </p:txBody>
+      </p:sp>
+      <p:pic>
+        <p:nvPicPr>
+          <p:cNvPr id="4" name="Picture 3"/>
+          <p:cNvPicPr>
+            <a:picLocks noChangeAspect="1"/>
+          </p:cNvPicPr>
+          <p:nvPr/>
+        </p:nvPicPr>
+        <p:blipFill>
+          <a:blip r:embed="rId2"/>
+          <a:stretch>
+            <a:fillRect/>
+          </a:stretch>
+        </p:blipFill>
+        <p:spPr>
+          <a:xfrm>
+            <a:off x="0" y="884976"/>
+            <a:ext cx="9144000" cy="5535448"/>
+          </a:xfrm>
+          <a:prstGeom prst="rect">
+            <a:avLst/>
+          </a:prstGeom>
+        </p:spPr>
+      </p:pic>
+    </p:spTree>
+    <p:extLst>
+      <p:ext uri="{BB962C8B-B14F-4D97-AF65-F5344CB8AC3E}">
+        <p14:creationId xmlns:p14="http://schemas.microsoft.com/office/powerpoint/2010/main" val="1511784055"/>
+      </p:ext>
+    </p:extLst>
+  </p:cSld>
+  <p:clrMapOvr>
+    <a:masterClrMapping/>
+  </p:clrMapOvr>
+</p:sld>
+</file>
+
+<file path=ppt/slides/slide34.xml><?xml version="1.0" encoding="utf-8"?>
+<p:sld xmlns:a="http://schemas.openxmlformats.org/drawingml/2006/main" xmlns:r="http://schemas.openxmlformats.org/officeDocument/2006/relationships" xmlns:p="http://schemas.openxmlformats.org/presentationml/2006/main">
+  <p:cSld>
+    <p:spTree>
+      <p:nvGrpSpPr>
+        <p:cNvPr id="1" name=""/>
+        <p:cNvGrpSpPr/>
+        <p:nvPr/>
+      </p:nvGrpSpPr>
+      <p:grpSpPr>
+        <a:xfrm>
+          <a:off x="0" y="0"/>
+          <a:ext cx="0" cy="0"/>
+          <a:chOff x="0" y="0"/>
+          <a:chExt cx="0" cy="0"/>
+        </a:xfrm>
+      </p:grpSpPr>
+      <p:sp>
+        <p:nvSpPr>
+          <p:cNvPr id="2" name="Title 1"/>
+          <p:cNvSpPr>
+            <a:spLocks noGrp="1"/>
+          </p:cNvSpPr>
+          <p:nvPr>
+            <p:ph type="title"/>
+          </p:nvPr>
+        </p:nvSpPr>
+        <p:spPr/>
+        <p:txBody>
+          <a:bodyPr>
+            <a:normAutofit/>
+          </a:bodyPr>
+          <a:lstStyle/>
+          <a:p>
+            <a:r>
+              <a:rPr lang="en-US" sz="3200" dirty="0" smtClean="0"/>
+              <a:t>Results, alternate aging list (</a:t>
+            </a:r>
+            <a:r>
+              <a:rPr lang="en-US" sz="3200" dirty="0" err="1" smtClean="0"/>
+              <a:t>Mistry</a:t>
+            </a:r>
+            <a:r>
+              <a:rPr lang="en-US" sz="3200" dirty="0" smtClean="0"/>
+              <a:t> and </a:t>
+            </a:r>
+            <a:r>
+              <a:rPr lang="en-US" sz="3200" dirty="0" err="1" smtClean="0"/>
+              <a:t>Pavlidis</a:t>
+            </a:r>
+            <a:r>
+              <a:rPr lang="en-US" sz="3200" dirty="0" smtClean="0"/>
+              <a:t>)</a:t>
+            </a:r>
+            <a:endParaRPr lang="en-US" sz="3200" dirty="0"/>
+          </a:p>
+        </p:txBody>
+      </p:sp>
+      <p:pic>
+        <p:nvPicPr>
+          <p:cNvPr id="4" name="Picture 3"/>
+          <p:cNvPicPr>
+            <a:picLocks noChangeAspect="1"/>
+          </p:cNvPicPr>
+          <p:nvPr/>
+        </p:nvPicPr>
+        <p:blipFill>
+          <a:blip r:embed="rId2"/>
+          <a:stretch>
+            <a:fillRect/>
+          </a:stretch>
+        </p:blipFill>
+        <p:spPr>
+          <a:xfrm>
+            <a:off x="0" y="2273300"/>
+            <a:ext cx="9144000" cy="2297663"/>
+          </a:xfrm>
+          <a:prstGeom prst="rect">
+            <a:avLst/>
+          </a:prstGeom>
+        </p:spPr>
+      </p:pic>
+    </p:spTree>
+    <p:extLst>
+      <p:ext uri="{BB962C8B-B14F-4D97-AF65-F5344CB8AC3E}">
+        <p14:creationId xmlns:p14="http://schemas.microsoft.com/office/powerpoint/2010/main" val="3588649421"/>
+      </p:ext>
+    </p:extLst>
+  </p:cSld>
+  <p:clrMapOvr>
+    <a:masterClrMapping/>
+  </p:clrMapOvr>
+</p:sld>
+</file>
+
+<file path=ppt/slides/slide35.xml><?xml version="1.0" encoding="utf-8"?>
+<p:sld xmlns:a="http://schemas.openxmlformats.org/drawingml/2006/main" xmlns:r="http://schemas.openxmlformats.org/officeDocument/2006/relationships" xmlns:p="http://schemas.openxmlformats.org/presentationml/2006/main">
+  <p:cSld>
+    <p:spTree>
+      <p:nvGrpSpPr>
+        <p:cNvPr id="1" name=""/>
+        <p:cNvGrpSpPr/>
+        <p:nvPr/>
+      </p:nvGrpSpPr>
+      <p:grpSpPr>
+        <a:xfrm>
+          <a:off x="0" y="0"/>
+          <a:ext cx="0" cy="0"/>
+          <a:chOff x="0" y="0"/>
+          <a:chExt cx="0" cy="0"/>
+        </a:xfrm>
+      </p:grpSpPr>
+      <p:sp>
+        <p:nvSpPr>
+          <p:cNvPr id="4" name="Title 1"/>
+          <p:cNvSpPr>
+            <a:spLocks noGrp="1"/>
+          </p:cNvSpPr>
+          <p:nvPr>
+            <p:ph type="title"/>
+          </p:nvPr>
+        </p:nvSpPr>
+        <p:spPr>
+          <a:xfrm>
+            <a:off x="457200" y="274638"/>
+            <a:ext cx="8229600" cy="1143000"/>
+          </a:xfrm>
+        </p:spPr>
+        <p:txBody>
+          <a:bodyPr>
+            <a:normAutofit/>
+          </a:bodyPr>
+          <a:lstStyle/>
+          <a:p>
+            <a:r>
+              <a:rPr lang="en-US" dirty="0" smtClean="0"/>
+              <a:t>Blood aging list</a:t>
+            </a:r>
+            <a:br>
+              <a:rPr lang="en-US" dirty="0" smtClean="0"/>
+            </a:br>
+            <a:r>
+              <a:rPr lang="en-US" sz="1800" dirty="0" smtClean="0"/>
+              <a:t>The transcriptional landscape of age in human peripheral blood, Peters et al., 2015</a:t>
+            </a:r>
+            <a:endParaRPr lang="en-US" sz="1800" dirty="0"/>
+          </a:p>
+        </p:txBody>
+      </p:sp>
+      <p:pic>
+        <p:nvPicPr>
+          <p:cNvPr id="5" name="Picture 4"/>
+          <p:cNvPicPr>
+            <a:picLocks noChangeAspect="1"/>
+          </p:cNvPicPr>
+          <p:nvPr/>
+        </p:nvPicPr>
+        <p:blipFill>
+          <a:blip r:embed="rId2"/>
+          <a:stretch>
+            <a:fillRect/>
+          </a:stretch>
+        </p:blipFill>
+        <p:spPr>
+          <a:xfrm>
+            <a:off x="0" y="2286000"/>
+            <a:ext cx="9144000" cy="2280183"/>
+          </a:xfrm>
+          <a:prstGeom prst="rect">
+            <a:avLst/>
+          </a:prstGeom>
+        </p:spPr>
+      </p:pic>
+    </p:spTree>
+    <p:extLst>
+      <p:ext uri="{BB962C8B-B14F-4D97-AF65-F5344CB8AC3E}">
+        <p14:creationId xmlns:p14="http://schemas.microsoft.com/office/powerpoint/2010/main" val="108902475"/>
+      </p:ext>
+    </p:extLst>
+  </p:cSld>
+  <p:clrMapOvr>
+    <a:masterClrMapping/>
+  </p:clrMapOvr>
+</p:sld>
+</file>
+
+<file path=ppt/slides/slide36.xml><?xml version="1.0" encoding="utf-8"?>
+<p:sld xmlns:a="http://schemas.openxmlformats.org/drawingml/2006/main" xmlns:r="http://schemas.openxmlformats.org/officeDocument/2006/relationships" xmlns:p="http://schemas.openxmlformats.org/presentationml/2006/main">
+  <p:cSld>
+    <p:spTree>
+      <p:nvGrpSpPr>
+        <p:cNvPr id="1" name=""/>
+        <p:cNvGrpSpPr/>
+        <p:nvPr/>
+      </p:nvGrpSpPr>
+      <p:grpSpPr>
+        <a:xfrm>
+          <a:off x="0" y="0"/>
+          <a:ext cx="0" cy="0"/>
+          <a:chOff x="0" y="0"/>
+          <a:chExt cx="0" cy="0"/>
+        </a:xfrm>
+      </p:grpSpPr>
+      <p:sp>
+        <p:nvSpPr>
+          <p:cNvPr id="2" name="Title 1"/>
+          <p:cNvSpPr>
+            <a:spLocks noGrp="1"/>
+          </p:cNvSpPr>
+          <p:nvPr>
+            <p:ph type="title"/>
+          </p:nvPr>
+        </p:nvSpPr>
+        <p:spPr/>
+        <p:txBody>
+          <a:bodyPr/>
+          <a:lstStyle/>
+          <a:p>
+            <a:r>
+              <a:rPr lang="en-US" dirty="0" smtClean="0"/>
+              <a:t>Summary</a:t>
+            </a:r>
+            <a:endParaRPr lang="en-US" dirty="0"/>
+          </a:p>
+        </p:txBody>
+      </p:sp>
+      <p:sp>
+        <p:nvSpPr>
+          <p:cNvPr id="3" name="Content Placeholder 2"/>
+          <p:cNvSpPr>
+            <a:spLocks noGrp="1"/>
+          </p:cNvSpPr>
+          <p:nvPr>
+            <p:ph idx="1"/>
+          </p:nvPr>
+        </p:nvSpPr>
+        <p:spPr/>
+        <p:txBody>
+          <a:bodyPr/>
+          <a:lstStyle/>
+          <a:p>
+            <a:r>
+              <a:rPr lang="en-US" dirty="0" smtClean="0"/>
+              <a:t>Enrichment for:</a:t>
+            </a:r>
+          </a:p>
+          <a:p>
+            <a:pPr lvl="1"/>
+            <a:r>
+              <a:rPr lang="en-US" dirty="0" smtClean="0"/>
+              <a:t>Astrocytes</a:t>
+            </a:r>
+          </a:p>
+          <a:p>
+            <a:pPr lvl="1"/>
+            <a:r>
+              <a:rPr lang="en-US" dirty="0" err="1" smtClean="0"/>
+              <a:t>Oligodenrocytes</a:t>
+            </a:r>
+            <a:endParaRPr lang="en-US" dirty="0" smtClean="0"/>
+          </a:p>
+          <a:p>
+            <a:pPr lvl="1"/>
+            <a:r>
+              <a:rPr lang="en-US" dirty="0" smtClean="0"/>
+              <a:t>Subsets of excitatory neurons (layer 2/3)</a:t>
+            </a:r>
+          </a:p>
+          <a:p>
+            <a:pPr lvl="1"/>
+            <a:r>
+              <a:rPr lang="en-US" dirty="0" smtClean="0"/>
+              <a:t>Weak to no enrichment for inhibitory neuron specific genes</a:t>
+            </a:r>
+          </a:p>
+          <a:p>
+            <a:r>
+              <a:rPr lang="en-US" dirty="0" err="1" smtClean="0"/>
+              <a:t>Mistry</a:t>
+            </a:r>
+            <a:r>
+              <a:rPr lang="en-US" dirty="0" smtClean="0"/>
+              <a:t> list has enrichment for endothelia-mural expressed genes</a:t>
+            </a:r>
+          </a:p>
+          <a:p>
+            <a:endParaRPr lang="en-US" dirty="0"/>
+          </a:p>
+        </p:txBody>
+      </p:sp>
+    </p:spTree>
+    <p:extLst>
+      <p:ext uri="{BB962C8B-B14F-4D97-AF65-F5344CB8AC3E}">
+        <p14:creationId xmlns:p14="http://schemas.microsoft.com/office/powerpoint/2010/main" val="3918163664"/>
+      </p:ext>
+    </p:extLst>
+  </p:cSld>
+  <p:clrMapOvr>
+    <a:masterClrMapping/>
+  </p:clrMapOvr>
+</p:sld>
+</file>
+
+<file path=ppt/slides/slide37.xml><?xml version="1.0" encoding="utf-8"?>
+<p:sld xmlns:a="http://schemas.openxmlformats.org/drawingml/2006/main" xmlns:r="http://schemas.openxmlformats.org/officeDocument/2006/relationships" xmlns:p="http://schemas.openxmlformats.org/presentationml/2006/main">
+  <p:cSld>
+    <p:spTree>
+      <p:nvGrpSpPr>
+        <p:cNvPr id="1" name=""/>
+        <p:cNvGrpSpPr/>
+        <p:nvPr/>
+      </p:nvGrpSpPr>
+      <p:grpSpPr>
+        <a:xfrm>
+          <a:off x="0" y="0"/>
+          <a:ext cx="0" cy="0"/>
+          <a:chOff x="0" y="0"/>
+          <a:chExt cx="0" cy="0"/>
+        </a:xfrm>
+      </p:grpSpPr>
+      <p:sp>
+        <p:nvSpPr>
+          <p:cNvPr id="2" name="Title 1"/>
+          <p:cNvSpPr>
+            <a:spLocks noGrp="1"/>
+          </p:cNvSpPr>
+          <p:nvPr>
+            <p:ph type="title"/>
+          </p:nvPr>
+        </p:nvSpPr>
+        <p:spPr/>
+        <p:txBody>
+          <a:bodyPr/>
+          <a:lstStyle/>
+          <a:p>
+            <a:r>
+              <a:rPr lang="en-US" dirty="0" err="1" smtClean="0"/>
+              <a:t>Todo</a:t>
+            </a:r>
+            <a:r>
+              <a:rPr lang="en-US" dirty="0" smtClean="0"/>
+              <a:t> list</a:t>
+            </a:r>
+            <a:endParaRPr lang="en-US" dirty="0"/>
+          </a:p>
+        </p:txBody>
+      </p:sp>
+      <p:sp>
+        <p:nvSpPr>
+          <p:cNvPr id="3" name="Content Placeholder 2"/>
+          <p:cNvSpPr>
+            <a:spLocks noGrp="1"/>
+          </p:cNvSpPr>
+          <p:nvPr>
+            <p:ph idx="1"/>
+          </p:nvPr>
+        </p:nvSpPr>
+        <p:spPr/>
+        <p:txBody>
+          <a:bodyPr/>
+          <a:lstStyle/>
+          <a:p>
+            <a:r>
+              <a:rPr lang="en-US" dirty="0" smtClean="0"/>
+              <a:t>Reconcile with past results</a:t>
+            </a:r>
+          </a:p>
+          <a:p>
+            <a:r>
+              <a:rPr lang="en-US" dirty="0" smtClean="0"/>
+              <a:t>GSEA method and visualization</a:t>
+            </a:r>
+          </a:p>
+          <a:p>
+            <a:r>
+              <a:rPr lang="en-US" dirty="0" smtClean="0"/>
+              <a:t>Create and send tables for review</a:t>
+            </a:r>
+          </a:p>
+          <a:p>
+            <a:endParaRPr lang="en-US" dirty="0"/>
+          </a:p>
+        </p:txBody>
+      </p:sp>
+    </p:spTree>
+    <p:extLst>
+      <p:ext uri="{BB962C8B-B14F-4D97-AF65-F5344CB8AC3E}">
+        <p14:creationId xmlns:p14="http://schemas.microsoft.com/office/powerpoint/2010/main" val="437314662"/>
       </p:ext>
     </p:extLst>
   </p:cSld>

</xml_diff>